<commit_message>
Change all files in projects
</commit_message>
<xml_diff>
--- a/public/projects/10-main-sewage-collector-khimikiv/10-main-sewage-collector.pptx
+++ b/public/projects/10-main-sewage-collector-khimikiv/10-main-sewage-collector.pptx
@@ -322,7 +322,7 @@
             <a:fld id="{1D8BD707-D9CF-40AE-B4C6-C98DA3205C09}" type="datetimeFigureOut">
               <a:rPr lang="en-US" smtClean="0"/>
               <a:pPr/>
-              <a:t>11/5/2024</a:t>
+              <a:t>11/6/2024</a:t>
             </a:fld>
             <a:endParaRPr lang="en-US"/>
           </a:p>
@@ -487,7 +487,7 @@
             <a:fld id="{1D8BD707-D9CF-40AE-B4C6-C98DA3205C09}" type="datetimeFigureOut">
               <a:rPr lang="en-US" smtClean="0"/>
               <a:pPr/>
-              <a:t>11/5/2024</a:t>
+              <a:t>11/6/2024</a:t>
             </a:fld>
             <a:endParaRPr lang="en-US"/>
           </a:p>
@@ -662,7 +662,7 @@
             <a:fld id="{1D8BD707-D9CF-40AE-B4C6-C98DA3205C09}" type="datetimeFigureOut">
               <a:rPr lang="en-US" smtClean="0"/>
               <a:pPr/>
-              <a:t>11/5/2024</a:t>
+              <a:t>11/6/2024</a:t>
             </a:fld>
             <a:endParaRPr lang="en-US"/>
           </a:p>
@@ -827,7 +827,7 @@
             <a:fld id="{1D8BD707-D9CF-40AE-B4C6-C98DA3205C09}" type="datetimeFigureOut">
               <a:rPr lang="en-US" smtClean="0"/>
               <a:pPr/>
-              <a:t>11/5/2024</a:t>
+              <a:t>11/6/2024</a:t>
             </a:fld>
             <a:endParaRPr lang="en-US"/>
           </a:p>
@@ -1069,7 +1069,7 @@
             <a:fld id="{1D8BD707-D9CF-40AE-B4C6-C98DA3205C09}" type="datetimeFigureOut">
               <a:rPr lang="en-US" smtClean="0"/>
               <a:pPr/>
-              <a:t>11/5/2024</a:t>
+              <a:t>11/6/2024</a:t>
             </a:fld>
             <a:endParaRPr lang="en-US"/>
           </a:p>
@@ -1351,7 +1351,7 @@
             <a:fld id="{1D8BD707-D9CF-40AE-B4C6-C98DA3205C09}" type="datetimeFigureOut">
               <a:rPr lang="en-US" smtClean="0"/>
               <a:pPr/>
-              <a:t>11/5/2024</a:t>
+              <a:t>11/6/2024</a:t>
             </a:fld>
             <a:endParaRPr lang="en-US"/>
           </a:p>
@@ -1767,7 +1767,7 @@
             <a:fld id="{1D8BD707-D9CF-40AE-B4C6-C98DA3205C09}" type="datetimeFigureOut">
               <a:rPr lang="en-US" smtClean="0"/>
               <a:pPr/>
-              <a:t>11/5/2024</a:t>
+              <a:t>11/6/2024</a:t>
             </a:fld>
             <a:endParaRPr lang="en-US"/>
           </a:p>
@@ -1881,7 +1881,7 @@
             <a:fld id="{1D8BD707-D9CF-40AE-B4C6-C98DA3205C09}" type="datetimeFigureOut">
               <a:rPr lang="en-US" smtClean="0"/>
               <a:pPr/>
-              <a:t>11/5/2024</a:t>
+              <a:t>11/6/2024</a:t>
             </a:fld>
             <a:endParaRPr lang="en-US"/>
           </a:p>
@@ -1973,7 +1973,7 @@
             <a:fld id="{1D8BD707-D9CF-40AE-B4C6-C98DA3205C09}" type="datetimeFigureOut">
               <a:rPr lang="en-US" smtClean="0"/>
               <a:pPr/>
-              <a:t>11/5/2024</a:t>
+              <a:t>11/6/2024</a:t>
             </a:fld>
             <a:endParaRPr lang="en-US"/>
           </a:p>
@@ -2245,7 +2245,7 @@
             <a:fld id="{1D8BD707-D9CF-40AE-B4C6-C98DA3205C09}" type="datetimeFigureOut">
               <a:rPr lang="en-US" smtClean="0"/>
               <a:pPr/>
-              <a:t>11/5/2024</a:t>
+              <a:t>11/6/2024</a:t>
             </a:fld>
             <a:endParaRPr lang="en-US"/>
           </a:p>
@@ -2494,7 +2494,7 @@
             <a:fld id="{1D8BD707-D9CF-40AE-B4C6-C98DA3205C09}" type="datetimeFigureOut">
               <a:rPr lang="en-US" smtClean="0"/>
               <a:pPr/>
-              <a:t>11/5/2024</a:t>
+              <a:t>11/6/2024</a:t>
             </a:fld>
             <a:endParaRPr lang="en-US"/>
           </a:p>
@@ -2702,7 +2702,7 @@
             <a:fld id="{1D8BD707-D9CF-40AE-B4C6-C98DA3205C09}" type="datetimeFigureOut">
               <a:rPr lang="en-US" smtClean="0"/>
               <a:pPr/>
-              <a:t>11/5/2024</a:t>
+              <a:t>11/6/2024</a:t>
             </a:fld>
             <a:endParaRPr lang="en-US"/>
           </a:p>
@@ -3403,58 +3403,6 @@
           </a:blipFill>
         </p:spPr>
       </p:sp>
-      <p:sp>
-        <p:nvSpPr>
-          <p:cNvPr id="12" name="Freeform 12"/>
-          <p:cNvSpPr/>
-          <p:nvPr/>
-        </p:nvSpPr>
-        <p:spPr>
-          <a:xfrm>
-            <a:off x="0" y="5826825"/>
-            <a:ext cx="4404422" cy="4460175"/>
-          </a:xfrm>
-          <a:custGeom>
-            <a:avLst/>
-            <a:gdLst/>
-            <a:ahLst/>
-            <a:cxnLst/>
-            <a:rect l="l" t="t" r="r" b="b"/>
-            <a:pathLst>
-              <a:path w="4404422" h="4460175">
-                <a:moveTo>
-                  <a:pt x="0" y="0"/>
-                </a:moveTo>
-                <a:lnTo>
-                  <a:pt x="4404422" y="0"/>
-                </a:lnTo>
-                <a:lnTo>
-                  <a:pt x="4404422" y="4460175"/>
-                </a:lnTo>
-                <a:lnTo>
-                  <a:pt x="0" y="4460175"/>
-                </a:lnTo>
-                <a:lnTo>
-                  <a:pt x="0" y="0"/>
-                </a:lnTo>
-                <a:close/>
-              </a:path>
-            </a:pathLst>
-          </a:custGeom>
-          <a:blipFill>
-            <a:blip r:embed="rId5">
-              <a:extLst>
-                <a:ext uri="{96DAC541-7B7A-43D3-8B79-37D633B846F1}">
-                  <asvg:svgBlip xmlns:asvg="http://schemas.microsoft.com/office/drawing/2016/SVG/main" r:embed="rId6"/>
-                </a:ext>
-              </a:extLst>
-            </a:blip>
-            <a:stretch>
-              <a:fillRect t="-14" b="-14"/>
-            </a:stretch>
-          </a:blipFill>
-        </p:spPr>
-      </p:sp>
       <p:grpSp>
         <p:nvGrpSpPr>
           <p:cNvPr id="13" name="Group 13"/>
@@ -3516,67 +3464,6 @@
           </p:spPr>
         </p:sp>
       </p:grpSp>
-      <p:grpSp>
-        <p:nvGrpSpPr>
-          <p:cNvPr id="15" name="Group 15"/>
-          <p:cNvGrpSpPr/>
-          <p:nvPr/>
-        </p:nvGrpSpPr>
-        <p:grpSpPr>
-          <a:xfrm>
-            <a:off x="245223" y="8602503"/>
-            <a:ext cx="2269949" cy="1268334"/>
-            <a:chOff x="0" y="0"/>
-            <a:chExt cx="2679201" cy="1497004"/>
-          </a:xfrm>
-        </p:grpSpPr>
-        <p:sp>
-          <p:nvSpPr>
-            <p:cNvPr id="16" name="Freeform 16"/>
-            <p:cNvSpPr/>
-            <p:nvPr/>
-          </p:nvSpPr>
-          <p:spPr>
-            <a:xfrm>
-              <a:off x="0" y="0"/>
-              <a:ext cx="2679192" cy="1496949"/>
-            </a:xfrm>
-            <a:custGeom>
-              <a:avLst/>
-              <a:gdLst/>
-              <a:ahLst/>
-              <a:cxnLst/>
-              <a:rect l="l" t="t" r="r" b="b"/>
-              <a:pathLst>
-                <a:path w="2679192" h="1496949">
-                  <a:moveTo>
-                    <a:pt x="0" y="0"/>
-                  </a:moveTo>
-                  <a:lnTo>
-                    <a:pt x="2679192" y="0"/>
-                  </a:lnTo>
-                  <a:lnTo>
-                    <a:pt x="2679192" y="1496949"/>
-                  </a:lnTo>
-                  <a:lnTo>
-                    <a:pt x="0" y="1496949"/>
-                  </a:lnTo>
-                  <a:lnTo>
-                    <a:pt x="0" y="0"/>
-                  </a:lnTo>
-                  <a:close/>
-                </a:path>
-              </a:pathLst>
-            </a:custGeom>
-            <a:blipFill>
-              <a:blip r:embed="rId8"/>
-              <a:stretch>
-                <a:fillRect t="-51" b="-54"/>
-              </a:stretch>
-            </a:blipFill>
-          </p:spPr>
-        </p:sp>
-      </p:grpSp>
       <p:sp>
         <p:nvSpPr>
           <p:cNvPr id="17" name="Freeform 17"/>
@@ -3616,7 +3503,7 @@
             </a:pathLst>
           </a:custGeom>
           <a:blipFill>
-            <a:blip r:embed="rId9"/>
+            <a:blip r:embed="rId8"/>
             <a:stretch>
               <a:fillRect/>
             </a:stretch>
@@ -3773,7 +3660,7 @@
               </a:pathLst>
             </a:custGeom>
             <a:blipFill>
-              <a:blip r:embed="rId10"/>
+              <a:blip r:embed="rId9"/>
               <a:stretch>
                 <a:fillRect t="-5116" b="-5116"/>
               </a:stretch>
@@ -3781,6 +3668,116 @@
           </p:spPr>
         </p:sp>
       </p:grpSp>
+      <p:sp>
+        <p:nvSpPr>
+          <p:cNvPr id="21" name="Freeform 14">
+            <a:extLst>
+              <a:ext uri="{FF2B5EF4-FFF2-40B4-BE49-F238E27FC236}">
+                <a16:creationId xmlns:a16="http://schemas.microsoft.com/office/drawing/2014/main" id="{F391C3A6-498E-41A1-993B-634DDD3CA081}"/>
+              </a:ext>
+            </a:extLst>
+          </p:cNvPr>
+          <p:cNvSpPr/>
+          <p:nvPr/>
+        </p:nvSpPr>
+        <p:spPr>
+          <a:xfrm>
+            <a:off x="-1788546" y="6226834"/>
+            <a:ext cx="4404422" cy="4460175"/>
+          </a:xfrm>
+          <a:custGeom>
+            <a:avLst/>
+            <a:gdLst/>
+            <a:ahLst/>
+            <a:cxnLst/>
+            <a:rect l="l" t="t" r="r" b="b"/>
+            <a:pathLst>
+              <a:path w="4404422" h="4460175">
+                <a:moveTo>
+                  <a:pt x="0" y="0"/>
+                </a:moveTo>
+                <a:lnTo>
+                  <a:pt x="4404422" y="0"/>
+                </a:lnTo>
+                <a:lnTo>
+                  <a:pt x="4404422" y="4460174"/>
+                </a:lnTo>
+                <a:lnTo>
+                  <a:pt x="0" y="4460174"/>
+                </a:lnTo>
+                <a:lnTo>
+                  <a:pt x="0" y="0"/>
+                </a:lnTo>
+                <a:close/>
+              </a:path>
+            </a:pathLst>
+          </a:custGeom>
+          <a:blipFill>
+            <a:blip r:embed="rId10">
+              <a:extLst>
+                <a:ext uri="{96DAC541-7B7A-43D3-8B79-37D633B846F1}">
+                  <asvg:svgBlip xmlns:asvg="http://schemas.microsoft.com/office/drawing/2016/SVG/main" r:embed="rId11"/>
+                </a:ext>
+              </a:extLst>
+            </a:blip>
+            <a:stretch>
+              <a:fillRect/>
+            </a:stretch>
+          </a:blipFill>
+        </p:spPr>
+      </p:sp>
+      <p:sp>
+        <p:nvSpPr>
+          <p:cNvPr id="22" name="Freeform 17">
+            <a:extLst>
+              <a:ext uri="{FF2B5EF4-FFF2-40B4-BE49-F238E27FC236}">
+                <a16:creationId xmlns:a16="http://schemas.microsoft.com/office/drawing/2014/main" id="{043FF6DA-75A1-4767-B1B2-0331E87EF228}"/>
+              </a:ext>
+            </a:extLst>
+          </p:cNvPr>
+          <p:cNvSpPr/>
+          <p:nvPr/>
+        </p:nvSpPr>
+        <p:spPr>
+          <a:xfrm>
+            <a:off x="245223" y="8748084"/>
+            <a:ext cx="2009401" cy="1122753"/>
+          </a:xfrm>
+          <a:custGeom>
+            <a:avLst/>
+            <a:gdLst/>
+            <a:ahLst/>
+            <a:cxnLst/>
+            <a:rect l="l" t="t" r="r" b="b"/>
+            <a:pathLst>
+              <a:path w="2009401" h="1122753">
+                <a:moveTo>
+                  <a:pt x="0" y="0"/>
+                </a:moveTo>
+                <a:lnTo>
+                  <a:pt x="2009401" y="0"/>
+                </a:lnTo>
+                <a:lnTo>
+                  <a:pt x="2009401" y="1122753"/>
+                </a:lnTo>
+                <a:lnTo>
+                  <a:pt x="0" y="1122753"/>
+                </a:lnTo>
+                <a:lnTo>
+                  <a:pt x="0" y="0"/>
+                </a:lnTo>
+                <a:close/>
+              </a:path>
+            </a:pathLst>
+          </a:custGeom>
+          <a:blipFill>
+            <a:blip r:embed="rId12"/>
+            <a:stretch>
+              <a:fillRect/>
+            </a:stretch>
+          </a:blipFill>
+        </p:spPr>
+      </p:sp>
     </p:spTree>
   </p:cSld>
   <p:clrMapOvr>

</xml_diff>